<commit_message>
LE_11_02_CO - Mapa conceptual
Corrección solicitada
</commit_message>
<xml_diff>
--- a/fuentes/contenidos/grado11/guion02/Mapa Conceptual_LE_11_02_CO.pptx
+++ b/fuentes/contenidos/grado11/guion02/Mapa Conceptual_LE_11_02_CO.pptx
@@ -112,7 +112,7 @@
   </p:defaultTextStyle>
   <p:extLst>
     <p:ext uri="{EFAFB233-063F-42B5-8137-9DF3F51BA10A}">
-      <p15:sldGuideLst xmlns:p15="http://schemas.microsoft.com/office/powerpoint/2012/main" xmlns="">
+      <p15:sldGuideLst xmlns="" xmlns:p15="http://schemas.microsoft.com/office/powerpoint/2012/main">
         <p15:guide id="1" orient="horz" pos="2160">
           <p15:clr>
             <a:srgbClr val="A4A3A4"/>
@@ -211,7 +211,7 @@
           <a:p>
             <a:fld id="{EBF1C2F2-CB39-4FDD-B2B3-260C54C71FC0}" type="datetimeFigureOut">
               <a:rPr lang="es-CO" smtClean="0"/>
-              <a:t>19/08/2015</a:t>
+              <a:t>03/09/2015</a:t>
             </a:fld>
             <a:endParaRPr lang="es-CO"/>
           </a:p>
@@ -817,7 +817,7 @@
           <a:p>
             <a:fld id="{5001C876-01F7-4317-94B9-1AE222133113}" type="datetimeFigureOut">
               <a:rPr lang="es-ES" smtClean="0"/>
-              <a:t>19/08/2015</a:t>
+              <a:t>03/09/2015</a:t>
             </a:fld>
             <a:endParaRPr lang="es-ES"/>
           </a:p>
@@ -1429,11 +1429,7 @@
             <a:pPr algn="ctr"/>
             <a:r>
               <a:rPr lang="es-ES" sz="1600" dirty="0" smtClean="0"/>
-              <a:t>Literatura de la </a:t>
-            </a:r>
-            <a:r>
-              <a:rPr lang="es-ES" sz="1600" dirty="0" smtClean="0"/>
-              <a:t>Antigüedad</a:t>
+              <a:t>Literatura de la Antigüedad</a:t>
             </a:r>
             <a:endParaRPr lang="es-ES" sz="1600" dirty="0"/>
           </a:p>
@@ -1566,7 +1562,7 @@
           </a:xfrm>
           <a:prstGeom prst="bentConnector3">
             <a:avLst>
-              <a:gd name="adj1" fmla="val 100075"/>
+              <a:gd name="adj1" fmla="val 108759"/>
             </a:avLst>
           </a:prstGeom>
           <a:ln w="12700">
@@ -2099,22 +2095,40 @@
                   <a:schemeClr val="tx1"/>
                 </a:solidFill>
               </a:rPr>
-              <a:t>Argumentativo</a:t>
-            </a:r>
+              <a:t>argumentativo</a:t>
+            </a:r>
+            <a:endParaRPr lang="es-ES" sz="800" dirty="0" smtClean="0">
+              <a:solidFill>
+                <a:schemeClr val="tx1"/>
+              </a:solidFill>
+            </a:endParaRPr>
           </a:p>
           <a:p>
             <a:pPr marL="171450" indent="-171450">
               <a:buFont typeface="Arial" panose="020B0604020202020204" pitchFamily="34" charset="0"/>
               <a:buChar char="•"/>
             </a:pPr>
+            <a:r>
+              <a:rPr lang="es-ES" sz="800" dirty="0">
+                <a:solidFill>
+                  <a:schemeClr val="tx1"/>
+                </a:solidFill>
+              </a:rPr>
+              <a:t>d</a:t>
+            </a:r>
             <a:r>
               <a:rPr lang="es-ES" sz="800" dirty="0" smtClean="0">
                 <a:solidFill>
                   <a:schemeClr val="tx1"/>
                 </a:solidFill>
               </a:rPr>
-              <a:t>Descriptivo</a:t>
-            </a:r>
+              <a:t>escriptivo</a:t>
+            </a:r>
+            <a:endParaRPr lang="es-ES" sz="800" dirty="0" smtClean="0">
+              <a:solidFill>
+                <a:schemeClr val="tx1"/>
+              </a:solidFill>
+            </a:endParaRPr>
           </a:p>
           <a:p>
             <a:pPr marL="171450" indent="-171450">
@@ -2127,8 +2141,13 @@
                   <a:schemeClr val="tx1"/>
                 </a:solidFill>
               </a:rPr>
-              <a:t>Informativo</a:t>
-            </a:r>
+              <a:t>informativo</a:t>
+            </a:r>
+            <a:endParaRPr lang="es-ES" sz="800" dirty="0" smtClean="0">
+              <a:solidFill>
+                <a:schemeClr val="tx1"/>
+              </a:solidFill>
+            </a:endParaRPr>
           </a:p>
           <a:p>
             <a:pPr marL="171450" indent="-171450">
@@ -2141,21 +2160,34 @@
                   <a:schemeClr val="tx1"/>
                 </a:solidFill>
               </a:rPr>
-              <a:t>Dialogado</a:t>
-            </a:r>
+              <a:t>dialogado</a:t>
+            </a:r>
+            <a:endParaRPr lang="es-ES" sz="800" dirty="0" smtClean="0">
+              <a:solidFill>
+                <a:schemeClr val="tx1"/>
+              </a:solidFill>
+            </a:endParaRPr>
           </a:p>
           <a:p>
             <a:pPr marL="171450" indent="-171450">
               <a:buFont typeface="Arial" panose="020B0604020202020204" pitchFamily="34" charset="0"/>
               <a:buChar char="•"/>
             </a:pPr>
+            <a:r>
+              <a:rPr lang="es-ES" sz="800" dirty="0">
+                <a:solidFill>
+                  <a:schemeClr val="tx1"/>
+                </a:solidFill>
+              </a:rPr>
+              <a:t>l</a:t>
+            </a:r>
             <a:r>
               <a:rPr lang="es-ES" sz="800" dirty="0" smtClean="0">
                 <a:solidFill>
                   <a:schemeClr val="tx1"/>
                 </a:solidFill>
               </a:rPr>
-              <a:t>Literario</a:t>
+              <a:t>iterario</a:t>
             </a:r>
             <a:endParaRPr lang="es-ES" sz="800" dirty="0">
               <a:solidFill>
@@ -2477,13 +2509,13 @@
           <p:nvPr/>
         </p:nvCxnSpPr>
         <p:spPr>
-          <a:xfrm rot="5400000">
-            <a:off x="7801186" y="671713"/>
-            <a:ext cx="158417" cy="1"/>
+          <a:xfrm rot="16200000" flipH="1">
+            <a:off x="8369924" y="628899"/>
+            <a:ext cx="124673" cy="1"/>
           </a:xfrm>
           <a:prstGeom prst="bentConnector3">
             <a:avLst>
-              <a:gd name="adj1" fmla="val 57595"/>
+              <a:gd name="adj1" fmla="val 50000"/>
             </a:avLst>
           </a:prstGeom>
           <a:ln w="12700">
@@ -2515,8 +2547,8 @@
         </p:nvSpPr>
         <p:spPr>
           <a:xfrm>
-            <a:off x="6387665" y="739877"/>
-            <a:ext cx="1861800" cy="464491"/>
+            <a:off x="6766462" y="686479"/>
+            <a:ext cx="1033291" cy="464491"/>
           </a:xfrm>
           <a:prstGeom prst="rect">
             <a:avLst/>
@@ -2558,7 +2590,14 @@
             <a:pPr algn="ctr"/>
             <a:r>
               <a:rPr lang="es-ES" sz="1000" b="1" dirty="0" smtClean="0"/>
-              <a:t>Comprensión y producción textual</a:t>
+              <a:t>Medios de </a:t>
+            </a:r>
+          </a:p>
+          <a:p>
+            <a:pPr algn="ctr"/>
+            <a:r>
+              <a:rPr lang="es-ES" sz="1000" b="1" dirty="0" smtClean="0"/>
+              <a:t>comunicación</a:t>
             </a:r>
             <a:endParaRPr lang="es-ES" sz="1000" b="1" dirty="0"/>
           </a:p>
@@ -3292,7 +3331,11 @@
             <a:pPr algn="ctr"/>
             <a:r>
               <a:rPr lang="es-ES" sz="800" dirty="0" smtClean="0"/>
-              <a:t>por lo cual se clasifica en</a:t>
+              <a:t>se </a:t>
+            </a:r>
+            <a:r>
+              <a:rPr lang="es-ES" sz="800" dirty="0" smtClean="0"/>
+              <a:t>clasifica en</a:t>
             </a:r>
             <a:endParaRPr lang="es-ES" sz="800" dirty="0"/>
           </a:p>
@@ -3743,8 +3786,13 @@
                   <a:schemeClr val="tx1"/>
                 </a:solidFill>
               </a:rPr>
-              <a:t>Cruzadas</a:t>
-            </a:r>
+              <a:t>cruzadas</a:t>
+            </a:r>
+            <a:endParaRPr lang="es-CO" sz="800" dirty="0" smtClean="0">
+              <a:solidFill>
+                <a:schemeClr val="tx1"/>
+              </a:solidFill>
+            </a:endParaRPr>
           </a:p>
           <a:p>
             <a:pPr marL="171450" indent="-171450">
@@ -4062,7 +4110,7 @@
         </p:nvSpPr>
         <p:spPr>
           <a:xfrm>
-            <a:off x="6749184" y="1543505"/>
+            <a:off x="6776894" y="1543505"/>
             <a:ext cx="930440" cy="333177"/>
           </a:xfrm>
           <a:prstGeom prst="rect">
@@ -4130,7 +4178,7 @@
         </p:nvSpPr>
         <p:spPr>
           <a:xfrm>
-            <a:off x="7753702" y="1543505"/>
+            <a:off x="7842374" y="1543505"/>
             <a:ext cx="1125378" cy="333177"/>
           </a:xfrm>
           <a:prstGeom prst="rect">
@@ -6897,8 +6945,8 @@
         </p:nvSpPr>
         <p:spPr>
           <a:xfrm>
-            <a:off x="7578181" y="2039647"/>
-            <a:ext cx="1739563" cy="215444"/>
+            <a:off x="7805404" y="2039647"/>
+            <a:ext cx="1277644" cy="215444"/>
           </a:xfrm>
           <a:prstGeom prst="rect">
             <a:avLst/>
@@ -7386,88 +7434,21 @@
       </p:cxnSp>
       <p:cxnSp>
         <p:nvCxnSpPr>
-          <p:cNvPr id="330" name="Conector recto 329"/>
+          <p:cNvPr id="333" name="Conector angular 332"/>
           <p:cNvCxnSpPr/>
           <p:nvPr/>
         </p:nvCxnSpPr>
         <p:spPr>
-          <a:xfrm flipV="1">
-            <a:off x="6304050" y="1392479"/>
-            <a:ext cx="1945415" cy="6668"/>
-          </a:xfrm>
-          <a:prstGeom prst="line">
-            <a:avLst/>
-          </a:prstGeom>
-        </p:spPr>
-        <p:style>
-          <a:lnRef idx="2">
-            <a:schemeClr val="dk1"/>
-          </a:lnRef>
-          <a:fillRef idx="0">
-            <a:schemeClr val="dk1"/>
-          </a:fillRef>
-          <a:effectRef idx="1">
-            <a:schemeClr val="dk1"/>
-          </a:effectRef>
-          <a:fontRef idx="minor">
-            <a:schemeClr val="tx1"/>
-          </a:fontRef>
-        </p:style>
-      </p:cxnSp>
-      <p:cxnSp>
-        <p:nvCxnSpPr>
-          <p:cNvPr id="331" name="Conector angular 330"/>
-          <p:cNvCxnSpPr/>
-          <p:nvPr/>
-        </p:nvCxnSpPr>
-        <p:spPr>
           <a:xfrm rot="5400000" flipH="1" flipV="1">
-            <a:off x="6299293" y="1521058"/>
+            <a:off x="8426197" y="1525155"/>
             <a:ext cx="22215" cy="12700"/>
           </a:xfrm>
           <a:prstGeom prst="bentConnector3">
             <a:avLst>
-              <a:gd name="adj1" fmla="val 664353"/>
+              <a:gd name="adj1" fmla="val 1758150"/>
             </a:avLst>
           </a:prstGeom>
-          <a:ln w="12700">
-            <a:solidFill>
-              <a:schemeClr val="tx1"/>
-            </a:solidFill>
-          </a:ln>
-        </p:spPr>
-        <p:style>
-          <a:lnRef idx="1">
-            <a:schemeClr val="accent1"/>
-          </a:lnRef>
-          <a:fillRef idx="0">
-            <a:schemeClr val="accent1"/>
-          </a:fillRef>
-          <a:effectRef idx="0">
-            <a:schemeClr val="accent1"/>
-          </a:effectRef>
-          <a:fontRef idx="minor">
-            <a:schemeClr val="tx1"/>
-          </a:fontRef>
-        </p:style>
-      </p:cxnSp>
-      <p:cxnSp>
-        <p:nvCxnSpPr>
-          <p:cNvPr id="333" name="Conector angular 332"/>
-          <p:cNvCxnSpPr/>
-          <p:nvPr/>
-        </p:nvCxnSpPr>
-        <p:spPr>
-          <a:xfrm rot="5400000" flipH="1" flipV="1">
-            <a:off x="8253559" y="1525155"/>
-            <a:ext cx="22215" cy="12700"/>
-          </a:xfrm>
-          <a:prstGeom prst="bentConnector3">
-            <a:avLst>
-              <a:gd name="adj1" fmla="val 664353"/>
-            </a:avLst>
-          </a:prstGeom>
-          <a:ln w="12700">
+          <a:ln w="9525">
             <a:solidFill>
               <a:schemeClr val="tx1"/>
             </a:solidFill>
@@ -7501,7 +7482,7 @@
           </a:xfrm>
           <a:prstGeom prst="bentConnector3">
             <a:avLst>
-              <a:gd name="adj1" fmla="val 1639226"/>
+              <a:gd name="adj1" fmla="val 1811929"/>
             </a:avLst>
           </a:prstGeom>
           <a:ln w="12700">
@@ -7801,6 +7782,238 @@
           </a:p>
         </p:txBody>
       </p:sp>
+      <p:sp>
+        <p:nvSpPr>
+          <p:cNvPr id="141" name="Rectángulo 131" descr="Nodo de primer nivel" title="Nodo01"/>
+          <p:cNvSpPr/>
+          <p:nvPr/>
+        </p:nvSpPr>
+        <p:spPr>
+          <a:xfrm>
+            <a:off x="5523630" y="692409"/>
+            <a:ext cx="1139559" cy="464491"/>
+          </a:xfrm>
+          <a:prstGeom prst="rect">
+            <a:avLst/>
+          </a:prstGeom>
+          <a:solidFill>
+            <a:schemeClr val="bg1"/>
+          </a:solidFill>
+          <a:ln>
+            <a:solidFill>
+              <a:schemeClr val="tx1"/>
+            </a:solidFill>
+          </a:ln>
+          <a:effectLst>
+            <a:outerShdw blurRad="50800" dist="38100" dir="2700000" algn="tl" rotWithShape="0">
+              <a:prstClr val="black">
+                <a:alpha val="40000"/>
+              </a:prstClr>
+            </a:outerShdw>
+          </a:effectLst>
+        </p:spPr>
+        <p:style>
+          <a:lnRef idx="2">
+            <a:schemeClr val="accent6"/>
+          </a:lnRef>
+          <a:fillRef idx="1">
+            <a:schemeClr val="lt1"/>
+          </a:fillRef>
+          <a:effectRef idx="0">
+            <a:schemeClr val="accent6"/>
+          </a:effectRef>
+          <a:fontRef idx="minor">
+            <a:schemeClr val="dk1"/>
+          </a:fontRef>
+        </p:style>
+        <p:txBody>
+          <a:bodyPr rtlCol="0" anchor="ctr"/>
+          <a:lstStyle/>
+          <a:p>
+            <a:pPr algn="ctr"/>
+            <a:r>
+              <a:rPr lang="es-ES" sz="1000" b="1" dirty="0" smtClean="0"/>
+              <a:t>Expresión oral</a:t>
+            </a:r>
+            <a:endParaRPr lang="es-ES" sz="1000" b="1" dirty="0"/>
+          </a:p>
+        </p:txBody>
+      </p:sp>
+      <p:cxnSp>
+        <p:nvCxnSpPr>
+          <p:cNvPr id="148" name="Conector angular 133"/>
+          <p:cNvCxnSpPr/>
+          <p:nvPr/>
+        </p:nvCxnSpPr>
+        <p:spPr>
+          <a:xfrm rot="16200000" flipH="1">
+            <a:off x="6046639" y="1472446"/>
+            <a:ext cx="116460" cy="1658"/>
+          </a:xfrm>
+          <a:prstGeom prst="bentConnector3">
+            <a:avLst>
+              <a:gd name="adj1" fmla="val -219533"/>
+            </a:avLst>
+          </a:prstGeom>
+          <a:ln w="12700">
+            <a:solidFill>
+              <a:schemeClr val="tx1"/>
+            </a:solidFill>
+          </a:ln>
+        </p:spPr>
+        <p:style>
+          <a:lnRef idx="1">
+            <a:schemeClr val="accent1"/>
+          </a:lnRef>
+          <a:fillRef idx="0">
+            <a:schemeClr val="accent1"/>
+          </a:fillRef>
+          <a:effectRef idx="0">
+            <a:schemeClr val="accent1"/>
+          </a:effectRef>
+          <a:fontRef idx="minor">
+            <a:schemeClr val="tx1"/>
+          </a:fontRef>
+        </p:style>
+      </p:cxnSp>
+      <p:sp>
+        <p:nvSpPr>
+          <p:cNvPr id="149" name="Rectángulo 131" descr="Nodo de primer nivel" title="Nodo01"/>
+          <p:cNvSpPr/>
+          <p:nvPr/>
+        </p:nvSpPr>
+        <p:spPr>
+          <a:xfrm>
+            <a:off x="7880395" y="692001"/>
+            <a:ext cx="1033291" cy="464491"/>
+          </a:xfrm>
+          <a:prstGeom prst="rect">
+            <a:avLst/>
+          </a:prstGeom>
+          <a:solidFill>
+            <a:schemeClr val="bg1"/>
+          </a:solidFill>
+          <a:ln>
+            <a:solidFill>
+              <a:schemeClr val="tx1"/>
+            </a:solidFill>
+          </a:ln>
+          <a:effectLst>
+            <a:outerShdw blurRad="50800" dist="38100" dir="2700000" algn="tl" rotWithShape="0">
+              <a:prstClr val="black">
+                <a:alpha val="40000"/>
+              </a:prstClr>
+            </a:outerShdw>
+          </a:effectLst>
+        </p:spPr>
+        <p:style>
+          <a:lnRef idx="2">
+            <a:schemeClr val="accent6"/>
+          </a:lnRef>
+          <a:fillRef idx="1">
+            <a:schemeClr val="lt1"/>
+          </a:fillRef>
+          <a:effectRef idx="0">
+            <a:schemeClr val="accent6"/>
+          </a:effectRef>
+          <a:fontRef idx="minor">
+            <a:schemeClr val="dk1"/>
+          </a:fontRef>
+        </p:style>
+        <p:txBody>
+          <a:bodyPr rtlCol="0" anchor="ctr"/>
+          <a:lstStyle/>
+          <a:p>
+            <a:pPr algn="ctr"/>
+            <a:r>
+              <a:rPr lang="es-ES" sz="1000" b="1" dirty="0" smtClean="0"/>
+              <a:t>Ética y</a:t>
+            </a:r>
+          </a:p>
+          <a:p>
+            <a:pPr algn="ctr"/>
+            <a:r>
+              <a:rPr lang="es-ES" sz="1000" b="1" dirty="0" smtClean="0"/>
+              <a:t>comunicación</a:t>
+            </a:r>
+            <a:endParaRPr lang="es-ES" sz="1000" b="1" dirty="0"/>
+          </a:p>
+        </p:txBody>
+      </p:sp>
+      <p:cxnSp>
+        <p:nvCxnSpPr>
+          <p:cNvPr id="153" name="Conector angular 135"/>
+          <p:cNvCxnSpPr/>
+          <p:nvPr/>
+        </p:nvCxnSpPr>
+        <p:spPr>
+          <a:xfrm rot="16200000" flipH="1">
+            <a:off x="7214420" y="622789"/>
+            <a:ext cx="124673" cy="1"/>
+          </a:xfrm>
+          <a:prstGeom prst="bentConnector3">
+            <a:avLst>
+              <a:gd name="adj1" fmla="val 50000"/>
+            </a:avLst>
+          </a:prstGeom>
+          <a:ln w="12700">
+            <a:solidFill>
+              <a:schemeClr val="tx1"/>
+            </a:solidFill>
+          </a:ln>
+        </p:spPr>
+        <p:style>
+          <a:lnRef idx="1">
+            <a:schemeClr val="accent1"/>
+          </a:lnRef>
+          <a:fillRef idx="0">
+            <a:schemeClr val="accent1"/>
+          </a:fillRef>
+          <a:effectRef idx="0">
+            <a:schemeClr val="accent1"/>
+          </a:effectRef>
+          <a:fontRef idx="minor">
+            <a:schemeClr val="tx1"/>
+          </a:fontRef>
+        </p:style>
+      </p:cxnSp>
+      <p:cxnSp>
+        <p:nvCxnSpPr>
+          <p:cNvPr id="157" name="Conector angular 135"/>
+          <p:cNvCxnSpPr/>
+          <p:nvPr/>
+        </p:nvCxnSpPr>
+        <p:spPr>
+          <a:xfrm rot="16200000" flipH="1">
+            <a:off x="6043362" y="630072"/>
+            <a:ext cx="124673" cy="1"/>
+          </a:xfrm>
+          <a:prstGeom prst="bentConnector3">
+            <a:avLst>
+              <a:gd name="adj1" fmla="val 50000"/>
+            </a:avLst>
+          </a:prstGeom>
+          <a:ln w="12700">
+            <a:solidFill>
+              <a:schemeClr val="tx1"/>
+            </a:solidFill>
+          </a:ln>
+        </p:spPr>
+        <p:style>
+          <a:lnRef idx="1">
+            <a:schemeClr val="accent1"/>
+          </a:lnRef>
+          <a:fillRef idx="0">
+            <a:schemeClr val="accent1"/>
+          </a:fillRef>
+          <a:effectRef idx="0">
+            <a:schemeClr val="accent1"/>
+          </a:effectRef>
+          <a:fontRef idx="minor">
+            <a:schemeClr val="tx1"/>
+          </a:fontRef>
+        </p:style>
+      </p:cxnSp>
     </p:spTree>
     <p:custDataLst>
       <p:tags r:id="rId1"/>
@@ -8093,7 +8306,7 @@
   <a:extraClrSchemeLst/>
   <a:extLst>
     <a:ext uri="{05A4C25C-085E-4340-85A3-A5531E510DB2}">
-      <thm15:themeFamily xmlns:thm15="http://schemas.microsoft.com/office/thememl/2012/main" xmlns="" name="Office Theme" id="{62F939B6-93AF-4DB8-9C6B-D6C7DFDC589F}" vid="{4A3C46E8-61CC-4603-A589-7422A47A8E4A}"/>
+      <thm15:themeFamily xmlns="" xmlns:thm15="http://schemas.microsoft.com/office/thememl/2012/main" name="Office Theme" id="{62F939B6-93AF-4DB8-9C6B-D6C7DFDC589F}" vid="{4A3C46E8-61CC-4603-A589-7422A47A8E4A}"/>
     </a:ext>
   </a:extLst>
 </a:theme>
@@ -8354,7 +8567,7 @@
   <a:extraClrSchemeLst/>
   <a:extLst>
     <a:ext uri="{05A4C25C-085E-4340-85A3-A5531E510DB2}">
-      <thm15:themeFamily xmlns:thm15="http://schemas.microsoft.com/office/thememl/2012/main" xmlns="" name="Office Theme" id="{62F939B6-93AF-4DB8-9C6B-D6C7DFDC589F}" vid="{4A3C46E8-61CC-4603-A589-7422A47A8E4A}"/>
+      <thm15:themeFamily xmlns="" xmlns:thm15="http://schemas.microsoft.com/office/thememl/2012/main" name="Office Theme" id="{62F939B6-93AF-4DB8-9C6B-D6C7DFDC589F}" vid="{4A3C46E8-61CC-4603-A589-7422A47A8E4A}"/>
     </a:ext>
   </a:extLst>
 </a:theme>

</xml_diff>